<commit_message>
"Entities" package added. Fixed some annotations
</commit_message>
<xml_diff>
--- a/UML/Presentation.pptx
+++ b/UML/Presentation.pptx
@@ -232,7 +232,7 @@
           <a:p>
             <a:fld id="{ED92C02F-46E9-4319-AE92-CFF24FDD2824}" type="datetimeFigureOut">
               <a:rPr lang="en-GB" smtClean="0"/>
-              <a:t>16/11/2021</a:t>
+              <a:t>19/11/2021</a:t>
             </a:fld>
             <a:endParaRPr lang="en-GB" dirty="0"/>
           </a:p>
@@ -631,7 +631,7 @@
           <a:p>
             <a:fld id="{4CAA9714-E498-4BB1-946F-9B4AA3A4C648}" type="datetimeFigureOut">
               <a:rPr lang="en-GB" smtClean="0"/>
-              <a:t>16/11/2021</a:t>
+              <a:t>19/11/2021</a:t>
             </a:fld>
             <a:endParaRPr lang="en-GB" dirty="0"/>
           </a:p>
@@ -801,7 +801,7 @@
           <a:p>
             <a:fld id="{4CAA9714-E498-4BB1-946F-9B4AA3A4C648}" type="datetimeFigureOut">
               <a:rPr lang="en-GB" smtClean="0"/>
-              <a:t>16/11/2021</a:t>
+              <a:t>19/11/2021</a:t>
             </a:fld>
             <a:endParaRPr lang="en-GB" dirty="0"/>
           </a:p>
@@ -981,7 +981,7 @@
           <a:p>
             <a:fld id="{4CAA9714-E498-4BB1-946F-9B4AA3A4C648}" type="datetimeFigureOut">
               <a:rPr lang="en-GB" smtClean="0"/>
-              <a:t>16/11/2021</a:t>
+              <a:t>19/11/2021</a:t>
             </a:fld>
             <a:endParaRPr lang="en-GB" dirty="0"/>
           </a:p>
@@ -1151,7 +1151,7 @@
           <a:p>
             <a:fld id="{4CAA9714-E498-4BB1-946F-9B4AA3A4C648}" type="datetimeFigureOut">
               <a:rPr lang="en-GB" smtClean="0"/>
-              <a:t>16/11/2021</a:t>
+              <a:t>19/11/2021</a:t>
             </a:fld>
             <a:endParaRPr lang="en-GB" dirty="0"/>
           </a:p>
@@ -1395,7 +1395,7 @@
           <a:p>
             <a:fld id="{4CAA9714-E498-4BB1-946F-9B4AA3A4C648}" type="datetimeFigureOut">
               <a:rPr lang="en-GB" smtClean="0"/>
-              <a:t>16/11/2021</a:t>
+              <a:t>19/11/2021</a:t>
             </a:fld>
             <a:endParaRPr lang="en-GB" dirty="0"/>
           </a:p>
@@ -1627,7 +1627,7 @@
           <a:p>
             <a:fld id="{4CAA9714-E498-4BB1-946F-9B4AA3A4C648}" type="datetimeFigureOut">
               <a:rPr lang="en-GB" smtClean="0"/>
-              <a:t>16/11/2021</a:t>
+              <a:t>19/11/2021</a:t>
             </a:fld>
             <a:endParaRPr lang="en-GB" dirty="0"/>
           </a:p>
@@ -1994,7 +1994,7 @@
           <a:p>
             <a:fld id="{4CAA9714-E498-4BB1-946F-9B4AA3A4C648}" type="datetimeFigureOut">
               <a:rPr lang="en-GB" smtClean="0"/>
-              <a:t>16/11/2021</a:t>
+              <a:t>19/11/2021</a:t>
             </a:fld>
             <a:endParaRPr lang="en-GB" dirty="0"/>
           </a:p>
@@ -2112,7 +2112,7 @@
           <a:p>
             <a:fld id="{4CAA9714-E498-4BB1-946F-9B4AA3A4C648}" type="datetimeFigureOut">
               <a:rPr lang="en-GB" smtClean="0"/>
-              <a:t>16/11/2021</a:t>
+              <a:t>19/11/2021</a:t>
             </a:fld>
             <a:endParaRPr lang="en-GB" dirty="0"/>
           </a:p>
@@ -2207,7 +2207,7 @@
           <a:p>
             <a:fld id="{4CAA9714-E498-4BB1-946F-9B4AA3A4C648}" type="datetimeFigureOut">
               <a:rPr lang="en-GB" smtClean="0"/>
-              <a:t>16/11/2021</a:t>
+              <a:t>19/11/2021</a:t>
             </a:fld>
             <a:endParaRPr lang="en-GB" dirty="0"/>
           </a:p>
@@ -2484,7 +2484,7 @@
           <a:p>
             <a:fld id="{4CAA9714-E498-4BB1-946F-9B4AA3A4C648}" type="datetimeFigureOut">
               <a:rPr lang="en-GB" smtClean="0"/>
-              <a:t>16/11/2021</a:t>
+              <a:t>19/11/2021</a:t>
             </a:fld>
             <a:endParaRPr lang="en-GB" dirty="0"/>
           </a:p>
@@ -2740,7 +2740,7 @@
           <a:p>
             <a:fld id="{4CAA9714-E498-4BB1-946F-9B4AA3A4C648}" type="datetimeFigureOut">
               <a:rPr lang="en-GB" smtClean="0"/>
-              <a:t>16/11/2021</a:t>
+              <a:t>19/11/2021</a:t>
             </a:fld>
             <a:endParaRPr lang="en-GB" dirty="0"/>
           </a:p>
@@ -2953,7 +2953,7 @@
           <a:p>
             <a:fld id="{4CAA9714-E498-4BB1-946F-9B4AA3A4C648}" type="datetimeFigureOut">
               <a:rPr lang="en-GB" smtClean="0"/>
-              <a:t>16/11/2021</a:t>
+              <a:t>19/11/2021</a:t>
             </a:fld>
             <a:endParaRPr lang="en-GB" dirty="0"/>
           </a:p>
@@ -3454,25 +3454,6 @@
           </a:p>
         </p:txBody>
       </p:sp>
-      <p:sp>
-        <p:nvSpPr>
-          <p:cNvPr id="5" name="Subtitle 4"/>
-          <p:cNvSpPr>
-            <a:spLocks noGrp="1"/>
-          </p:cNvSpPr>
-          <p:nvPr>
-            <p:ph type="subTitle" idx="1"/>
-          </p:nvPr>
-        </p:nvSpPr>
-        <p:spPr/>
-        <p:txBody>
-          <a:bodyPr/>
-          <a:lstStyle/>
-          <a:p>
-            <a:endParaRPr lang="it-IT"/>
-          </a:p>
-        </p:txBody>
-      </p:sp>
     </p:spTree>
     <p:extLst>
       <p:ext uri="{BB962C8B-B14F-4D97-AF65-F5344CB8AC3E}">
@@ -5864,7 +5845,7 @@
         </p:nvSpPr>
         <p:spPr>
           <a:xfrm>
-            <a:off x="204531" y="303656"/>
+            <a:off x="204531" y="-1259"/>
             <a:ext cx="7886700" cy="1325563"/>
           </a:xfrm>
         </p:spPr>
@@ -6217,7 +6198,7 @@
         </p:nvSpPr>
         <p:spPr>
           <a:xfrm>
-            <a:off x="2548363" y="2116800"/>
+            <a:off x="2517872" y="2125708"/>
             <a:ext cx="513282" cy="369332"/>
           </a:xfrm>
           <a:prstGeom prst="rect">
@@ -6275,7 +6256,7 @@
         </p:nvSpPr>
         <p:spPr>
           <a:xfrm>
-            <a:off x="1921429" y="1355558"/>
+            <a:off x="1765460" y="1365814"/>
             <a:ext cx="1165255" cy="369332"/>
           </a:xfrm>
           <a:prstGeom prst="rect">
@@ -8203,7 +8184,7 @@
             </a:r>
             <a:r>
               <a:rPr lang="en-GB" dirty="0"/>
-              <a:t>”containing” relationship the entity ”Service” includes three offers that can be associated to a package. The offers are:</a:t>
+              <a:t>”containing” relationship the entity ”Service” refers to the three offers that can be associated to a package. The offers are:</a:t>
             </a:r>
           </a:p>
           <a:p>
@@ -8225,6 +8206,28 @@
             <a:r>
               <a:rPr lang="en-GB" dirty="0"/>
               <a:t>Mobile internet</a:t>
+            </a:r>
+          </a:p>
+          <a:p>
+            <a:r>
+              <a:rPr lang="en-GB" dirty="0"/>
+              <a:t>The “offering“ relationship between </a:t>
+            </a:r>
+            <a:r>
+              <a:rPr lang="en-GB" dirty="0" err="1"/>
+              <a:t>ServicePackage</a:t>
+            </a:r>
+            <a:r>
+              <a:rPr lang="en-GB" dirty="0"/>
+              <a:t> and </a:t>
+            </a:r>
+            <a:r>
+              <a:rPr lang="en-GB" dirty="0" err="1"/>
+              <a:t>OptionalProduct</a:t>
+            </a:r>
+            <a:r>
+              <a:rPr lang="en-GB" dirty="0"/>
+              <a:t> is also omitted since it is equal to the “containing“ relationship</a:t>
             </a:r>
             <a:endParaRPr lang="it-IT" dirty="0"/>
           </a:p>
@@ -8270,7 +8273,12 @@
             <p:ph type="title"/>
           </p:nvPr>
         </p:nvSpPr>
-        <p:spPr/>
+        <p:spPr>
+          <a:xfrm>
+            <a:off x="628650" y="9956"/>
+            <a:ext cx="7886700" cy="1325563"/>
+          </a:xfrm>
+        </p:spPr>
         <p:txBody>
           <a:bodyPr/>
           <a:lstStyle/>
@@ -8747,27 +8755,66 @@
             <a:pPr lvl="1"/>
             <a:r>
               <a:rPr lang="it-IT" sz="2000" dirty="0"/>
-              <a:t>Revision of the specifications (if needed)</a:t>
-            </a:r>
-          </a:p>
-          <a:p>
+              <a:t>Revision of the </a:t>
+            </a:r>
+            <a:r>
+              <a:rPr lang="it-IT" sz="2000" dirty="0" err="1"/>
+              <a:t>specifications</a:t>
+            </a:r>
+            <a:endParaRPr lang="it-IT" sz="2000" dirty="0"/>
+          </a:p>
+          <a:p>
+            <a:r>
+              <a:rPr lang="it-IT" sz="2400" dirty="0" err="1"/>
+              <a:t>Conceptual</a:t>
+            </a:r>
             <a:r>
               <a:rPr lang="it-IT" sz="2400" dirty="0"/>
-              <a:t>Conceptual (ER) and logical data models</a:t>
-            </a:r>
+              <a:t> (ER) and </a:t>
+            </a:r>
+            <a:r>
+              <a:rPr lang="it-IT" sz="2400" dirty="0" err="1"/>
+              <a:t>logical</a:t>
+            </a:r>
+            <a:r>
+              <a:rPr lang="it-IT" sz="2400" dirty="0"/>
+              <a:t> data </a:t>
+            </a:r>
+            <a:r>
+              <a:rPr lang="it-IT" sz="2400" dirty="0" err="1"/>
+              <a:t>models</a:t>
+            </a:r>
+            <a:endParaRPr lang="it-IT" sz="2400" dirty="0"/>
           </a:p>
           <a:p>
             <a:pPr lvl="1"/>
             <a:r>
+              <a:rPr lang="it-IT" sz="2000" dirty="0" err="1"/>
+              <a:t>Explanation</a:t>
+            </a:r>
+            <a:r>
               <a:rPr lang="it-IT" sz="2000" dirty="0"/>
-              <a:t>Explanation of the ER diagram (if needed)</a:t>
-            </a:r>
+              <a:t> of the ER </a:t>
+            </a:r>
+            <a:r>
+              <a:rPr lang="it-IT" sz="2000" dirty="0" err="1"/>
+              <a:t>diagram</a:t>
+            </a:r>
+            <a:endParaRPr lang="it-IT" sz="2000" dirty="0"/>
           </a:p>
           <a:p>
             <a:pPr lvl="1"/>
             <a:r>
               <a:rPr lang="it-IT" sz="2000" dirty="0"/>
-              <a:t>Explanation of the logical model (if needed)</a:t>
+              <a:t>Explanation of the </a:t>
+            </a:r>
+            <a:r>
+              <a:rPr lang="it-IT" sz="2000" dirty="0" err="1"/>
+              <a:t>logical</a:t>
+            </a:r>
+            <a:r>
+              <a:rPr lang="it-IT" sz="2000" dirty="0"/>
+              <a:t> model</a:t>
             </a:r>
           </a:p>
           <a:p>
@@ -8804,13 +8851,21 @@
             <a:pPr lvl="1"/>
             <a:r>
               <a:rPr lang="it-IT" sz="2000" dirty="0"/>
-              <a:t>Motivations of the components design (if needed)</a:t>
+              <a:t>Motivations of the </a:t>
+            </a:r>
+            <a:r>
+              <a:rPr lang="it-IT" sz="2000" dirty="0" err="1"/>
+              <a:t>components</a:t>
+            </a:r>
+            <a:r>
+              <a:rPr lang="it-IT" sz="2000" dirty="0"/>
+              <a:t> design</a:t>
             </a:r>
           </a:p>
           <a:p>
             <a:r>
               <a:rPr lang="it-IT" sz="2400" dirty="0"/>
-              <a:t>UML sequence diagrams (optional, only for salient events)</a:t>
+              <a:t>UML sequence diagrams (optional)</a:t>
             </a:r>
           </a:p>
           <a:p>

</xml_diff>